<commit_message>
Indications for teachers included in different presentations.
</commit_message>
<xml_diff>
--- a/2_PHASE3_Requirements/docs/2.1 Writing requirements_EN.pptx
+++ b/2_PHASE3_Requirements/docs/2.1 Writing requirements_EN.pptx
@@ -12612,7 +12612,7 @@
           <a:p>
             <a:fld id="{DE2F9ED7-D9DF-9B4A-A1AC-9FBF0C9B1C8E}" type="datetime1">
               <a:rPr lang="es-ES" smtClean="0"/>
-              <a:t>11/07/2023</a:t>
+              <a:t>29/02/2024</a:t>
             </a:fld>
             <a:endParaRPr lang="en-US"/>
           </a:p>
@@ -12782,7 +12782,7 @@
           <a:p>
             <a:fld id="{FEDC53B6-CB23-B545-A702-0812837A95EA}" type="datetime1">
               <a:rPr lang="es-ES" smtClean="0"/>
-              <a:t>11/07/2023</a:t>
+              <a:t>29/02/2024</a:t>
             </a:fld>
             <a:endParaRPr lang="en-US"/>
           </a:p>
@@ -33904,6 +33904,78 @@
       </p:sp>
       <p:sp>
         <p:nvSpPr>
+          <p:cNvPr id="6" name="Marcador de contenido 5">
+            <a:extLst>
+              <a:ext uri="{FF2B5EF4-FFF2-40B4-BE49-F238E27FC236}">
+                <a16:creationId xmlns:a16="http://schemas.microsoft.com/office/drawing/2014/main" id="{D700C7E2-D3F1-4A4D-80AD-9640139B4822}"/>
+              </a:ext>
+            </a:extLst>
+          </p:cNvPr>
+          <p:cNvSpPr>
+            <a:spLocks noGrp="1"/>
+          </p:cNvSpPr>
+          <p:nvPr>
+            <p:ph sz="quarter" idx="13"/>
+          </p:nvPr>
+        </p:nvSpPr>
+        <p:spPr/>
+        <p:txBody>
+          <a:bodyPr/>
+          <a:lstStyle/>
+          <a:p>
+            <a:pPr algn="just"/>
+            <a:r>
+              <a:rPr lang="en-GB" dirty="0">
+                <a:latin typeface="Arial Nova Light" panose="020B0304020202020204" pitchFamily="34" charset="0"/>
+              </a:rPr>
+              <a:t>Prepare a Presentation or Video describing “What is a System Architecture”</a:t>
+            </a:r>
+          </a:p>
+          <a:p>
+            <a:pPr lvl="1" algn="just">
+              <a:lnSpc>
+                <a:spcPct val="150000"/>
+              </a:lnSpc>
+            </a:pPr>
+            <a:r>
+              <a:rPr lang="en-GB" dirty="0">
+                <a:solidFill>
+                  <a:schemeClr val="tx1"/>
+                </a:solidFill>
+                <a:latin typeface="Arial Nova Light" panose="020B0304020202020204" pitchFamily="34" charset="0"/>
+              </a:rPr>
+              <a:t>2-4 students per team.</a:t>
+            </a:r>
+          </a:p>
+          <a:p>
+            <a:pPr lvl="1" algn="just">
+              <a:lnSpc>
+                <a:spcPct val="150000"/>
+              </a:lnSpc>
+            </a:pPr>
+            <a:r>
+              <a:rPr lang="en-GB" dirty="0">
+                <a:solidFill>
+                  <a:schemeClr val="tx1"/>
+                </a:solidFill>
+                <a:latin typeface="Arial Nova Light" panose="020B0304020202020204" pitchFamily="34" charset="0"/>
+              </a:rPr>
+              <a:t>3 minutes.</a:t>
+            </a:r>
+            <a:endParaRPr lang="en-US" dirty="0">
+              <a:solidFill>
+                <a:schemeClr val="tx1"/>
+              </a:solidFill>
+              <a:latin typeface="Arial Nova Light" panose="020B0304020202020204" pitchFamily="34" charset="0"/>
+            </a:endParaRPr>
+          </a:p>
+          <a:p>
+            <a:endParaRPr lang="es-ES" dirty="0"/>
+          </a:p>
+        </p:txBody>
+      </p:sp>
+      <p:sp>
+        <p:nvSpPr>
           <p:cNvPr id="5" name="Título 4">
             <a:extLst>
               <a:ext uri="{FF2B5EF4-FFF2-40B4-BE49-F238E27FC236}">
@@ -33927,78 +33999,6 @@
               <a:rPr lang="en-GB" dirty="0"/>
               <a:t>Assignment for next day </a:t>
             </a:r>
-            <a:endParaRPr lang="es-ES" dirty="0"/>
-          </a:p>
-        </p:txBody>
-      </p:sp>
-      <p:sp>
-        <p:nvSpPr>
-          <p:cNvPr id="6" name="Marcador de contenido 5">
-            <a:extLst>
-              <a:ext uri="{FF2B5EF4-FFF2-40B4-BE49-F238E27FC236}">
-                <a16:creationId xmlns:a16="http://schemas.microsoft.com/office/drawing/2014/main" id="{D700C7E2-D3F1-4A4D-80AD-9640139B4822}"/>
-              </a:ext>
-            </a:extLst>
-          </p:cNvPr>
-          <p:cNvSpPr>
-            <a:spLocks noGrp="1"/>
-          </p:cNvSpPr>
-          <p:nvPr>
-            <p:ph sz="quarter" idx="13"/>
-          </p:nvPr>
-        </p:nvSpPr>
-        <p:spPr/>
-        <p:txBody>
-          <a:bodyPr/>
-          <a:lstStyle/>
-          <a:p>
-            <a:pPr algn="just"/>
-            <a:r>
-              <a:rPr lang="en-GB" dirty="0">
-                <a:latin typeface="Arial Nova Light" panose="020B0304020202020204" pitchFamily="34" charset="0"/>
-              </a:rPr>
-              <a:t>Prepare a Presentation or Video describing “What is a System Architecture”</a:t>
-            </a:r>
-          </a:p>
-          <a:p>
-            <a:pPr lvl="1" algn="just">
-              <a:lnSpc>
-                <a:spcPct val="150000"/>
-              </a:lnSpc>
-            </a:pPr>
-            <a:r>
-              <a:rPr lang="en-GB" dirty="0">
-                <a:solidFill>
-                  <a:schemeClr val="tx1"/>
-                </a:solidFill>
-                <a:latin typeface="Arial Nova Light" panose="020B0304020202020204" pitchFamily="34" charset="0"/>
-              </a:rPr>
-              <a:t>2-4 students per team.</a:t>
-            </a:r>
-          </a:p>
-          <a:p>
-            <a:pPr lvl="1" algn="just">
-              <a:lnSpc>
-                <a:spcPct val="150000"/>
-              </a:lnSpc>
-            </a:pPr>
-            <a:r>
-              <a:rPr lang="en-GB" dirty="0">
-                <a:solidFill>
-                  <a:schemeClr val="tx1"/>
-                </a:solidFill>
-                <a:latin typeface="Arial Nova Light" panose="020B0304020202020204" pitchFamily="34" charset="0"/>
-              </a:rPr>
-              <a:t>3 minutes.</a:t>
-            </a:r>
-            <a:endParaRPr lang="en-US" dirty="0">
-              <a:solidFill>
-                <a:schemeClr val="tx1"/>
-              </a:solidFill>
-              <a:latin typeface="Arial Nova Light" panose="020B0304020202020204" pitchFamily="34" charset="0"/>
-            </a:endParaRPr>
-          </a:p>
-          <a:p>
             <a:endParaRPr lang="es-ES" dirty="0"/>
           </a:p>
         </p:txBody>

</xml_diff>